<commit_message>
Tweaks to Mar 11
</commit_message>
<xml_diff>
--- a/Slides/031124.pptx
+++ b/Slides/031124.pptx
@@ -5,10 +5,10 @@
     <p:sldMasterId id="2147483648" r:id="rId1"/>
   </p:sldMasterIdLst>
   <p:notesMasterIdLst>
-    <p:notesMasterId r:id="rId36"/>
+    <p:notesMasterId r:id="rId37"/>
   </p:notesMasterIdLst>
   <p:handoutMasterIdLst>
-    <p:handoutMasterId r:id="rId37"/>
+    <p:handoutMasterId r:id="rId38"/>
   </p:handoutMasterIdLst>
   <p:sldIdLst>
     <p:sldId id="258" r:id="rId2"/>
@@ -33,18 +33,19 @@
     <p:sldId id="542" r:id="rId21"/>
     <p:sldId id="543" r:id="rId22"/>
     <p:sldId id="502" r:id="rId23"/>
-    <p:sldId id="503" r:id="rId24"/>
-    <p:sldId id="544" r:id="rId25"/>
-    <p:sldId id="545" r:id="rId26"/>
-    <p:sldId id="546" r:id="rId27"/>
-    <p:sldId id="547" r:id="rId28"/>
-    <p:sldId id="548" r:id="rId29"/>
-    <p:sldId id="550" r:id="rId30"/>
-    <p:sldId id="551" r:id="rId31"/>
-    <p:sldId id="552" r:id="rId32"/>
-    <p:sldId id="553" r:id="rId33"/>
-    <p:sldId id="554" r:id="rId34"/>
-    <p:sldId id="512" r:id="rId35"/>
+    <p:sldId id="559" r:id="rId24"/>
+    <p:sldId id="503" r:id="rId25"/>
+    <p:sldId id="544" r:id="rId26"/>
+    <p:sldId id="545" r:id="rId27"/>
+    <p:sldId id="546" r:id="rId28"/>
+    <p:sldId id="547" r:id="rId29"/>
+    <p:sldId id="548" r:id="rId30"/>
+    <p:sldId id="550" r:id="rId31"/>
+    <p:sldId id="551" r:id="rId32"/>
+    <p:sldId id="552" r:id="rId33"/>
+    <p:sldId id="553" r:id="rId34"/>
+    <p:sldId id="554" r:id="rId35"/>
+    <p:sldId id="512" r:id="rId36"/>
   </p:sldIdLst>
   <p:sldSz cx="9144000" cy="6858000" type="screen4x3"/>
   <p:notesSz cx="7315200" cy="9601200"/>
@@ -1916,7 +1917,7 @@
             <a:fld id="{C7E9A20B-E167-2E4E-BE18-AA9F5BF5FBB1}" type="slidenum">
               <a:rPr lang="en-US" smtClean="0"/>
               <a:pPr/>
-              <a:t>31</a:t>
+              <a:t>32</a:t>
             </a:fld>
             <a:endParaRPr lang="en-US"/>
           </a:p>
@@ -18555,6 +18556,443 @@
       </p:grpSpPr>
       <p:sp>
         <p:nvSpPr>
+          <p:cNvPr id="7" name="Title 6">
+            <a:extLst>
+              <a:ext uri="{FF2B5EF4-FFF2-40B4-BE49-F238E27FC236}">
+                <a16:creationId xmlns:a16="http://schemas.microsoft.com/office/drawing/2014/main" id="{55630225-FCCB-9847-B50B-51CA0A035304}"/>
+              </a:ext>
+            </a:extLst>
+          </p:cNvPr>
+          <p:cNvSpPr>
+            <a:spLocks noGrp="1"/>
+          </p:cNvSpPr>
+          <p:nvPr>
+            <p:ph type="title"/>
+          </p:nvPr>
+        </p:nvSpPr>
+        <p:spPr/>
+        <p:txBody>
+          <a:bodyPr/>
+          <a:lstStyle/>
+          <a:p>
+            <a:r>
+              <a:rPr lang="en-US" dirty="0"/>
+              <a:t>Thanks for the midterm eval!</a:t>
+            </a:r>
+          </a:p>
+        </p:txBody>
+      </p:sp>
+      <p:sp>
+        <p:nvSpPr>
+          <p:cNvPr id="8" name="Content Placeholder 7">
+            <a:extLst>
+              <a:ext uri="{FF2B5EF4-FFF2-40B4-BE49-F238E27FC236}">
+                <a16:creationId xmlns:a16="http://schemas.microsoft.com/office/drawing/2014/main" id="{BD049841-2FCD-A54B-9486-4E4DF19752F3}"/>
+              </a:ext>
+            </a:extLst>
+          </p:cNvPr>
+          <p:cNvSpPr>
+            <a:spLocks noGrp="1"/>
+          </p:cNvSpPr>
+          <p:nvPr>
+            <p:ph idx="1"/>
+          </p:nvPr>
+        </p:nvSpPr>
+        <p:spPr/>
+        <p:txBody>
+          <a:bodyPr/>
+          <a:lstStyle/>
+          <a:p>
+            <a:r>
+              <a:rPr lang="en-US" dirty="0">
+                <a:solidFill>
+                  <a:srgbClr val="FF0000"/>
+                </a:solidFill>
+              </a:rPr>
+              <a:t>Can’t do much about </a:t>
+            </a:r>
+            <a:r>
+              <a:rPr lang="en-US" dirty="0">
+                <a:solidFill>
+                  <a:srgbClr val="FF0000"/>
+                </a:solidFill>
+                <a:sym typeface="Wingdings" pitchFamily="2" charset="2"/>
+              </a:rPr>
+              <a:t> </a:t>
+            </a:r>
+            <a:endParaRPr lang="en-US" dirty="0">
+              <a:solidFill>
+                <a:srgbClr val="FF0000"/>
+              </a:solidFill>
+            </a:endParaRPr>
+          </a:p>
+          <a:p>
+            <a:pPr lvl="1"/>
+            <a:r>
+              <a:rPr lang="en-US" dirty="0"/>
+              <a:t>Not enough GSIs or IAs</a:t>
+            </a:r>
+          </a:p>
+          <a:p>
+            <a:pPr lvl="1"/>
+            <a:r>
+              <a:rPr lang="en-US" dirty="0"/>
+              <a:t>Assignments take too long/hard to debug</a:t>
+            </a:r>
+          </a:p>
+          <a:p>
+            <a:pPr lvl="1"/>
+            <a:r>
+              <a:rPr lang="en-US" dirty="0"/>
+              <a:t>Too many concepts</a:t>
+            </a:r>
+          </a:p>
+          <a:p>
+            <a:endParaRPr lang="en-US" dirty="0"/>
+          </a:p>
+          <a:p>
+            <a:r>
+              <a:rPr lang="en-US" dirty="0">
+                <a:solidFill>
+                  <a:srgbClr val="009900"/>
+                </a:solidFill>
+              </a:rPr>
+              <a:t>Will work on improving </a:t>
+            </a:r>
+            <a:r>
+              <a:rPr lang="en-US" dirty="0">
+                <a:solidFill>
+                  <a:srgbClr val="009900"/>
+                </a:solidFill>
+                <a:sym typeface="Wingdings" pitchFamily="2" charset="2"/>
+              </a:rPr>
+              <a:t></a:t>
+            </a:r>
+            <a:endParaRPr lang="en-US" dirty="0">
+              <a:solidFill>
+                <a:srgbClr val="009900"/>
+              </a:solidFill>
+            </a:endParaRPr>
+          </a:p>
+          <a:p>
+            <a:pPr lvl="1"/>
+            <a:r>
+              <a:rPr lang="en-US" dirty="0"/>
+              <a:t>Talk slower</a:t>
+            </a:r>
+          </a:p>
+          <a:p>
+            <a:pPr lvl="1"/>
+            <a:r>
+              <a:rPr lang="en-US" dirty="0"/>
+              <a:t>Cover everything &lt;&gt; Answer all questions</a:t>
+            </a:r>
+          </a:p>
+          <a:p>
+            <a:pPr lvl="1"/>
+            <a:r>
+              <a:rPr lang="en-US" dirty="0"/>
+              <a:t>Practice Exam</a:t>
+            </a:r>
+          </a:p>
+        </p:txBody>
+      </p:sp>
+      <p:sp>
+        <p:nvSpPr>
+          <p:cNvPr id="4" name="Date Placeholder 3">
+            <a:extLst>
+              <a:ext uri="{FF2B5EF4-FFF2-40B4-BE49-F238E27FC236}">
+                <a16:creationId xmlns:a16="http://schemas.microsoft.com/office/drawing/2014/main" id="{A5DC8F2C-DC17-5745-8D78-81EABF1E65D6}"/>
+              </a:ext>
+            </a:extLst>
+          </p:cNvPr>
+          <p:cNvSpPr>
+            <a:spLocks noGrp="1"/>
+          </p:cNvSpPr>
+          <p:nvPr>
+            <p:ph type="dt" sz="half" idx="10"/>
+          </p:nvPr>
+        </p:nvSpPr>
+        <p:spPr/>
+        <p:txBody>
+          <a:bodyPr/>
+          <a:lstStyle/>
+          <a:p>
+            <a:r>
+              <a:rPr lang="en-US"/>
+              <a:t>March 11, 2024</a:t>
+            </a:r>
+            <a:endParaRPr lang="en-US" sz="1050" b="0">
+              <a:latin typeface="Times New Roman" charset="0"/>
+            </a:endParaRPr>
+          </a:p>
+        </p:txBody>
+      </p:sp>
+      <p:sp>
+        <p:nvSpPr>
+          <p:cNvPr id="5" name="Footer Placeholder 4">
+            <a:extLst>
+              <a:ext uri="{FF2B5EF4-FFF2-40B4-BE49-F238E27FC236}">
+                <a16:creationId xmlns:a16="http://schemas.microsoft.com/office/drawing/2014/main" id="{D408C3C8-FE66-0441-8220-22FA6A3BFA73}"/>
+              </a:ext>
+            </a:extLst>
+          </p:cNvPr>
+          <p:cNvSpPr>
+            <a:spLocks noGrp="1"/>
+          </p:cNvSpPr>
+          <p:nvPr>
+            <p:ph type="ftr" sz="quarter" idx="11"/>
+          </p:nvPr>
+        </p:nvSpPr>
+        <p:spPr/>
+        <p:txBody>
+          <a:bodyPr/>
+          <a:lstStyle/>
+          <a:p>
+            <a:r>
+              <a:rPr lang="en-US"/>
+              <a:t>EECS 489 – Lecture 12</a:t>
+            </a:r>
+            <a:endParaRPr lang="en-US" sz="1050" b="0">
+              <a:latin typeface="Times New Roman" charset="0"/>
+            </a:endParaRPr>
+          </a:p>
+        </p:txBody>
+      </p:sp>
+      <p:sp>
+        <p:nvSpPr>
+          <p:cNvPr id="6" name="Slide Number Placeholder 5">
+            <a:extLst>
+              <a:ext uri="{FF2B5EF4-FFF2-40B4-BE49-F238E27FC236}">
+                <a16:creationId xmlns:a16="http://schemas.microsoft.com/office/drawing/2014/main" id="{9F786088-F8A7-2D47-B7BC-862F1D0CB9CC}"/>
+              </a:ext>
+            </a:extLst>
+          </p:cNvPr>
+          <p:cNvSpPr>
+            <a:spLocks noGrp="1"/>
+          </p:cNvSpPr>
+          <p:nvPr>
+            <p:ph type="sldNum" sz="quarter" idx="12"/>
+          </p:nvPr>
+        </p:nvSpPr>
+        <p:spPr/>
+        <p:txBody>
+          <a:bodyPr/>
+          <a:lstStyle/>
+          <a:p>
+            <a:fld id="{81F2EB77-FB6C-2244-A076-ADF097535D48}" type="slidenum">
+              <a:rPr lang="en-US" smtClean="0"/>
+              <a:pPr/>
+              <a:t>23</a:t>
+            </a:fld>
+            <a:endParaRPr lang="en-US"/>
+          </a:p>
+        </p:txBody>
+      </p:sp>
+    </p:spTree>
+    <p:extLst>
+      <p:ext uri="{BB962C8B-B14F-4D97-AF65-F5344CB8AC3E}">
+        <p14:creationId xmlns:p14="http://schemas.microsoft.com/office/powerpoint/2010/main" val="1049568576"/>
+      </p:ext>
+    </p:extLst>
+  </p:cSld>
+  <p:clrMapOvr>
+    <a:masterClrMapping/>
+  </p:clrMapOvr>
+  <p:timing>
+    <p:tnLst>
+      <p:par>
+        <p:cTn id="1" dur="indefinite" restart="never" nodeType="tmRoot">
+          <p:childTnLst>
+            <p:seq concurrent="1" nextAc="seek">
+              <p:cTn id="2" dur="indefinite" nodeType="mainSeq">
+                <p:childTnLst>
+                  <p:par>
+                    <p:cTn id="3" fill="hold">
+                      <p:stCondLst>
+                        <p:cond delay="indefinite"/>
+                      </p:stCondLst>
+                      <p:childTnLst>
+                        <p:par>
+                          <p:cTn id="4" fill="hold">
+                            <p:stCondLst>
+                              <p:cond delay="0"/>
+                            </p:stCondLst>
+                            <p:childTnLst>
+                              <p:par>
+                                <p:cTn id="5" presetID="1" presetClass="entr" presetSubtype="0" fill="hold" nodeType="clickEffect">
+                                  <p:stCondLst>
+                                    <p:cond delay="0"/>
+                                  </p:stCondLst>
+                                  <p:childTnLst>
+                                    <p:set>
+                                      <p:cBhvr>
+                                        <p:cTn id="6" dur="1" fill="hold">
+                                          <p:stCondLst>
+                                            <p:cond delay="0"/>
+                                          </p:stCondLst>
+                                        </p:cTn>
+                                        <p:tgtEl>
+                                          <p:spTgt spid="8">
+                                            <p:txEl>
+                                              <p:pRg st="5" end="5"/>
+                                            </p:txEl>
+                                          </p:spTgt>
+                                        </p:tgtEl>
+                                        <p:attrNameLst>
+                                          <p:attrName>style.visibility</p:attrName>
+                                        </p:attrNameLst>
+                                      </p:cBhvr>
+                                      <p:to>
+                                        <p:strVal val="visible"/>
+                                      </p:to>
+                                    </p:set>
+                                  </p:childTnLst>
+                                </p:cTn>
+                              </p:par>
+                              <p:par>
+                                <p:cTn id="7" presetID="1" presetClass="entr" presetSubtype="0" fill="hold" nodeType="withEffect">
+                                  <p:stCondLst>
+                                    <p:cond delay="0"/>
+                                  </p:stCondLst>
+                                  <p:childTnLst>
+                                    <p:set>
+                                      <p:cBhvr>
+                                        <p:cTn id="8" dur="1" fill="hold">
+                                          <p:stCondLst>
+                                            <p:cond delay="0"/>
+                                          </p:stCondLst>
+                                        </p:cTn>
+                                        <p:tgtEl>
+                                          <p:spTgt spid="8">
+                                            <p:txEl>
+                                              <p:pRg st="6" end="6"/>
+                                            </p:txEl>
+                                          </p:spTgt>
+                                        </p:tgtEl>
+                                        <p:attrNameLst>
+                                          <p:attrName>style.visibility</p:attrName>
+                                        </p:attrNameLst>
+                                      </p:cBhvr>
+                                      <p:to>
+                                        <p:strVal val="visible"/>
+                                      </p:to>
+                                    </p:set>
+                                  </p:childTnLst>
+                                </p:cTn>
+                              </p:par>
+                              <p:par>
+                                <p:cTn id="9" presetID="1" presetClass="entr" presetSubtype="0" fill="hold" nodeType="withEffect">
+                                  <p:stCondLst>
+                                    <p:cond delay="0"/>
+                                  </p:stCondLst>
+                                  <p:childTnLst>
+                                    <p:set>
+                                      <p:cBhvr>
+                                        <p:cTn id="10" dur="1" fill="hold">
+                                          <p:stCondLst>
+                                            <p:cond delay="0"/>
+                                          </p:stCondLst>
+                                        </p:cTn>
+                                        <p:tgtEl>
+                                          <p:spTgt spid="8">
+                                            <p:txEl>
+                                              <p:pRg st="7" end="7"/>
+                                            </p:txEl>
+                                          </p:spTgt>
+                                        </p:tgtEl>
+                                        <p:attrNameLst>
+                                          <p:attrName>style.visibility</p:attrName>
+                                        </p:attrNameLst>
+                                      </p:cBhvr>
+                                      <p:to>
+                                        <p:strVal val="visible"/>
+                                      </p:to>
+                                    </p:set>
+                                  </p:childTnLst>
+                                </p:cTn>
+                              </p:par>
+                              <p:par>
+                                <p:cTn id="11" presetID="1" presetClass="entr" presetSubtype="0" fill="hold" nodeType="withEffect">
+                                  <p:stCondLst>
+                                    <p:cond delay="0"/>
+                                  </p:stCondLst>
+                                  <p:childTnLst>
+                                    <p:set>
+                                      <p:cBhvr>
+                                        <p:cTn id="12" dur="1" fill="hold">
+                                          <p:stCondLst>
+                                            <p:cond delay="0"/>
+                                          </p:stCondLst>
+                                        </p:cTn>
+                                        <p:tgtEl>
+                                          <p:spTgt spid="8">
+                                            <p:txEl>
+                                              <p:pRg st="8" end="8"/>
+                                            </p:txEl>
+                                          </p:spTgt>
+                                        </p:tgtEl>
+                                        <p:attrNameLst>
+                                          <p:attrName>style.visibility</p:attrName>
+                                        </p:attrNameLst>
+                                      </p:cBhvr>
+                                      <p:to>
+                                        <p:strVal val="visible"/>
+                                      </p:to>
+                                    </p:set>
+                                  </p:childTnLst>
+                                </p:cTn>
+                              </p:par>
+                            </p:childTnLst>
+                          </p:cTn>
+                        </p:par>
+                      </p:childTnLst>
+                    </p:cTn>
+                  </p:par>
+                </p:childTnLst>
+              </p:cTn>
+              <p:prevCondLst>
+                <p:cond evt="onPrev" delay="0">
+                  <p:tgtEl>
+                    <p:sldTgt/>
+                  </p:tgtEl>
+                </p:cond>
+              </p:prevCondLst>
+              <p:nextCondLst>
+                <p:cond evt="onNext" delay="0">
+                  <p:tgtEl>
+                    <p:sldTgt/>
+                  </p:tgtEl>
+                </p:cond>
+              </p:nextCondLst>
+            </p:seq>
+          </p:childTnLst>
+        </p:cTn>
+      </p:par>
+    </p:tnLst>
+  </p:timing>
+</p:sld>
+</file>
+
+<file path=ppt/slides/slide24.xml><?xml version="1.0" encoding="utf-8"?>
+<p:sld xmlns:a="http://schemas.openxmlformats.org/drawingml/2006/main" xmlns:r="http://schemas.openxmlformats.org/officeDocument/2006/relationships" xmlns:p="http://schemas.openxmlformats.org/presentationml/2006/main">
+  <p:cSld>
+    <p:spTree>
+      <p:nvGrpSpPr>
+        <p:cNvPr id="1" name=""/>
+        <p:cNvGrpSpPr/>
+        <p:nvPr/>
+      </p:nvGrpSpPr>
+      <p:grpSpPr>
+        <a:xfrm>
+          <a:off x="0" y="0"/>
+          <a:ext cx="0" cy="0"/>
+          <a:chOff x="0" y="0"/>
+          <a:chExt cx="0" cy="0"/>
+        </a:xfrm>
+      </p:grpSpPr>
+      <p:sp>
+        <p:nvSpPr>
           <p:cNvPr id="7" name="Title 6"/>
           <p:cNvSpPr>
             <a:spLocks noGrp="1"/>
@@ -18592,30 +19030,14 @@
           <a:p>
             <a:r>
               <a:rPr lang="en-US" dirty="0"/>
-              <a:t>Midterm grades will be released by </a:t>
-            </a:r>
-            <a:r>
-              <a:rPr lang="en-US" dirty="0">
-                <a:solidFill>
-                  <a:srgbClr val="0000FF"/>
-                </a:solidFill>
-              </a:rPr>
-              <a:t>tomorrow</a:t>
+              <a:t>Midterm grades will be released by tomorrow</a:t>
             </a:r>
           </a:p>
           <a:p>
             <a:pPr lvl="1"/>
             <a:r>
               <a:rPr lang="en-US" dirty="0"/>
-              <a:t>Along with relevant details </a:t>
-            </a:r>
-            <a:r>
-              <a:rPr lang="en-US"/>
-              <a:t>(grade distribution</a:t>
-            </a:r>
-            <a:r>
-              <a:rPr lang="en-US" dirty="0"/>
-              <a:t>, regrading, etc.)</a:t>
+              <a:t>Along with relevant details (grade distribution, regrading, etc.)</a:t>
             </a:r>
           </a:p>
           <a:p>
@@ -18723,7 +19145,7 @@
             <a:fld id="{81F2EB77-FB6C-2244-A076-ADF097535D48}" type="slidenum">
               <a:rPr lang="en-US" smtClean="0"/>
               <a:pPr/>
-              <a:t>23</a:t>
+              <a:t>24</a:t>
             </a:fld>
             <a:endParaRPr lang="en-US"/>
           </a:p>
@@ -18742,7 +19164,7 @@
 </p:sld>
 </file>
 
-<file path=ppt/slides/slide24.xml><?xml version="1.0" encoding="utf-8"?>
+<file path=ppt/slides/slide25.xml><?xml version="1.0" encoding="utf-8"?>
 <p:sld xmlns:a="http://schemas.openxmlformats.org/drawingml/2006/main" xmlns:r="http://schemas.openxmlformats.org/officeDocument/2006/relationships" xmlns:p="http://schemas.openxmlformats.org/presentationml/2006/main">
   <p:cSld>
     <p:spTree>
@@ -18840,7 +19262,7 @@
             <a:fld id="{86CB4B4D-7CA3-9044-876B-883B54F8677D}" type="slidenum">
               <a:rPr lang="en-US" smtClean="0"/>
               <a:pPr lvl="0"/>
-              <a:t>24</a:t>
+              <a:t>25</a:t>
             </a:fld>
             <a:endParaRPr lang="en-US"/>
           </a:p>
@@ -18989,7 +19411,7 @@
 </p:sld>
 </file>
 
-<file path=ppt/slides/slide25.xml><?xml version="1.0" encoding="utf-8"?>
+<file path=ppt/slides/slide26.xml><?xml version="1.0" encoding="utf-8"?>
 <p:sld xmlns:a="http://schemas.openxmlformats.org/drawingml/2006/main" xmlns:r="http://schemas.openxmlformats.org/officeDocument/2006/relationships" xmlns:p="http://schemas.openxmlformats.org/presentationml/2006/main">
   <p:cSld>
     <p:spTree>
@@ -21550,7 +21972,7 @@
             <a:fld id="{9507A418-0CEB-9E4A-BA45-3B7D3D133EB9}" type="slidenum">
               <a:rPr lang="en-US" smtClean="0"/>
               <a:pPr/>
-              <a:t>25</a:t>
+              <a:t>26</a:t>
             </a:fld>
             <a:endParaRPr lang="en-US"/>
           </a:p>
@@ -21934,7 +22356,7 @@
 </p:sld>
 </file>
 
-<file path=ppt/slides/slide26.xml><?xml version="1.0" encoding="utf-8"?>
+<file path=ppt/slides/slide27.xml><?xml version="1.0" encoding="utf-8"?>
 <p:sld xmlns:a="http://schemas.openxmlformats.org/drawingml/2006/main" xmlns:r="http://schemas.openxmlformats.org/officeDocument/2006/relationships" xmlns:p="http://schemas.openxmlformats.org/presentationml/2006/main">
   <p:cSld>
     <p:spTree>
@@ -24579,7 +25001,7 @@
             <a:fld id="{9507A418-0CEB-9E4A-BA45-3B7D3D133EB9}" type="slidenum">
               <a:rPr lang="en-US" smtClean="0"/>
               <a:pPr/>
-              <a:t>26</a:t>
+              <a:t>27</a:t>
             </a:fld>
             <a:endParaRPr lang="en-US"/>
           </a:p>
@@ -25462,7 +25884,7 @@
 </p:sld>
 </file>
 
-<file path=ppt/slides/slide27.xml><?xml version="1.0" encoding="utf-8"?>
+<file path=ppt/slides/slide28.xml><?xml version="1.0" encoding="utf-8"?>
 <p:sld xmlns:a="http://schemas.openxmlformats.org/drawingml/2006/main" xmlns:r="http://schemas.openxmlformats.org/officeDocument/2006/relationships" xmlns:p="http://schemas.openxmlformats.org/presentationml/2006/main">
   <p:cSld>
     <p:spTree>
@@ -25624,7 +26046,7 @@
             <a:fld id="{A190D881-957A-7944-A8D0-1584E528B88F}" type="slidenum">
               <a:rPr lang="en-US" smtClean="0"/>
               <a:pPr/>
-              <a:t>27</a:t>
+              <a:t>28</a:t>
             </a:fld>
             <a:endParaRPr lang="en-US"/>
           </a:p>
@@ -25802,7 +26224,7 @@
 </p:sld>
 </file>
 
-<file path=ppt/slides/slide28.xml><?xml version="1.0" encoding="utf-8"?>
+<file path=ppt/slides/slide29.xml><?xml version="1.0" encoding="utf-8"?>
 <p:sld xmlns:a="http://schemas.openxmlformats.org/drawingml/2006/main" xmlns:r="http://schemas.openxmlformats.org/officeDocument/2006/relationships" xmlns:p="http://schemas.openxmlformats.org/presentationml/2006/main">
   <p:cSld>
     <p:spTree>
@@ -25948,7 +26370,7 @@
             <a:fld id="{A190D881-957A-7944-A8D0-1584E528B88F}" type="slidenum">
               <a:rPr lang="en-US" smtClean="0"/>
               <a:pPr/>
-              <a:t>28</a:t>
+              <a:t>29</a:t>
             </a:fld>
             <a:endParaRPr lang="en-US"/>
           </a:p>
@@ -26129,7 +26551,405 @@
 </p:sld>
 </file>
 
-<file path=ppt/slides/slide29.xml><?xml version="1.0" encoding="utf-8"?>
+<file path=ppt/slides/slide3.xml><?xml version="1.0" encoding="utf-8"?>
+<p:sld xmlns:a="http://schemas.openxmlformats.org/drawingml/2006/main" xmlns:r="http://schemas.openxmlformats.org/officeDocument/2006/relationships" xmlns:p="http://schemas.openxmlformats.org/presentationml/2006/main">
+  <p:cSld>
+    <p:spTree>
+      <p:nvGrpSpPr>
+        <p:cNvPr id="1" name=""/>
+        <p:cNvGrpSpPr/>
+        <p:nvPr/>
+      </p:nvGrpSpPr>
+      <p:grpSpPr>
+        <a:xfrm>
+          <a:off x="0" y="0"/>
+          <a:ext cx="0" cy="0"/>
+          <a:chOff x="0" y="0"/>
+          <a:chExt cx="0" cy="0"/>
+        </a:xfrm>
+      </p:grpSpPr>
+      <p:sp>
+        <p:nvSpPr>
+          <p:cNvPr id="4" name="Title 3"/>
+          <p:cNvSpPr>
+            <a:spLocks noGrp="1"/>
+          </p:cNvSpPr>
+          <p:nvPr>
+            <p:ph type="title"/>
+          </p:nvPr>
+        </p:nvSpPr>
+        <p:spPr/>
+        <p:txBody>
+          <a:bodyPr/>
+          <a:lstStyle/>
+          <a:p>
+            <a:r>
+              <a:rPr lang="en-US" dirty="0"/>
+              <a:t>Goal of routing</a:t>
+            </a:r>
+          </a:p>
+        </p:txBody>
+      </p:sp>
+      <p:sp>
+        <p:nvSpPr>
+          <p:cNvPr id="2" name="Text Placeholder 1"/>
+          <p:cNvSpPr>
+            <a:spLocks noGrp="1"/>
+          </p:cNvSpPr>
+          <p:nvPr>
+            <p:ph idx="1"/>
+          </p:nvPr>
+        </p:nvSpPr>
+        <p:spPr/>
+        <p:txBody>
+          <a:bodyPr/>
+          <a:lstStyle/>
+          <a:p>
+            <a:r>
+              <a:rPr lang="en-US" dirty="0"/>
+              <a:t>Find a path to a given destination</a:t>
+            </a:r>
+          </a:p>
+          <a:p>
+            <a:r>
+              <a:rPr lang="en-US" dirty="0"/>
+              <a:t>How do we know that the state contained in forwarding tables meets our goal?</a:t>
+            </a:r>
+          </a:p>
+          <a:p>
+            <a:pPr lvl="1"/>
+            <a:r>
+              <a:rPr lang="en-US" dirty="0"/>
+              <a:t>This is what “</a:t>
+            </a:r>
+            <a:r>
+              <a:rPr lang="en-US" dirty="0">
+                <a:solidFill>
+                  <a:srgbClr val="0000FF"/>
+                </a:solidFill>
+              </a:rPr>
+              <a:t>validity</a:t>
+            </a:r>
+            <a:r>
+              <a:rPr lang="en-US" dirty="0"/>
+              <a:t>” of routing state tells us</a:t>
+            </a:r>
+          </a:p>
+          <a:p>
+            <a:pPr lvl="1"/>
+            <a:r>
+              <a:rPr lang="en-US" dirty="0">
+                <a:solidFill>
+                  <a:srgbClr val="0000FF"/>
+                </a:solidFill>
+              </a:rPr>
+              <a:t>[This is non-standard terminology]</a:t>
+            </a:r>
+          </a:p>
+          <a:p>
+            <a:pPr lvl="1"/>
+            <a:endParaRPr lang="en-US" dirty="0"/>
+          </a:p>
+        </p:txBody>
+      </p:sp>
+      <p:sp>
+        <p:nvSpPr>
+          <p:cNvPr id="260" name="Shape 260"/>
+          <p:cNvSpPr>
+            <a:spLocks noGrp="1"/>
+          </p:cNvSpPr>
+          <p:nvPr>
+            <p:ph type="sldNum" sz="quarter" idx="12"/>
+          </p:nvPr>
+        </p:nvSpPr>
+        <p:spPr/>
+        <p:txBody>
+          <a:bodyPr/>
+          <a:lstStyle/>
+          <a:p>
+            <a:pPr lvl="0"/>
+            <a:fld id="{86CB4B4D-7CA3-9044-876B-883B54F8677D}" type="slidenum">
+              <a:rPr lang="en-US" smtClean="0"/>
+              <a:pPr lvl="0"/>
+              <a:t>3</a:t>
+            </a:fld>
+            <a:endParaRPr lang="en-US"/>
+          </a:p>
+        </p:txBody>
+      </p:sp>
+      <p:sp>
+        <p:nvSpPr>
+          <p:cNvPr id="7" name="Date Placeholder 6"/>
+          <p:cNvSpPr>
+            <a:spLocks noGrp="1"/>
+          </p:cNvSpPr>
+          <p:nvPr>
+            <p:ph type="dt" sz="half" idx="10"/>
+          </p:nvPr>
+        </p:nvSpPr>
+        <p:spPr/>
+        <p:txBody>
+          <a:bodyPr/>
+          <a:lstStyle/>
+          <a:p>
+            <a:r>
+              <a:rPr lang="en-US"/>
+              <a:t>March 11, 2024</a:t>
+            </a:r>
+            <a:endParaRPr lang="en-US" sz="1050" b="0">
+              <a:latin typeface="Times New Roman" charset="0"/>
+            </a:endParaRPr>
+          </a:p>
+        </p:txBody>
+      </p:sp>
+      <p:sp>
+        <p:nvSpPr>
+          <p:cNvPr id="8" name="Footer Placeholder 7"/>
+          <p:cNvSpPr>
+            <a:spLocks noGrp="1"/>
+          </p:cNvSpPr>
+          <p:nvPr>
+            <p:ph type="ftr" sz="quarter" idx="11"/>
+          </p:nvPr>
+        </p:nvSpPr>
+        <p:spPr/>
+        <p:txBody>
+          <a:bodyPr/>
+          <a:lstStyle/>
+          <a:p>
+            <a:r>
+              <a:rPr lang="en-US"/>
+              <a:t>EECS 489 – Lecture 12</a:t>
+            </a:r>
+            <a:endParaRPr lang="en-US" sz="1050" b="0">
+              <a:latin typeface="Times New Roman" charset="0"/>
+            </a:endParaRPr>
+          </a:p>
+        </p:txBody>
+      </p:sp>
+    </p:spTree>
+    <p:extLst>
+      <p:ext uri="{BB962C8B-B14F-4D97-AF65-F5344CB8AC3E}">
+        <p14:creationId xmlns:p14="http://schemas.microsoft.com/office/powerpoint/2010/main" val="1120625018"/>
+      </p:ext>
+    </p:extLst>
+  </p:cSld>
+  <p:clrMapOvr>
+    <a:masterClrMapping/>
+  </p:clrMapOvr>
+  <p:transition spd="med"/>
+  <p:timing>
+    <p:tnLst>
+      <p:par>
+        <p:cTn id="1" dur="indefinite" restart="never" nodeType="tmRoot">
+          <p:childTnLst>
+            <p:seq concurrent="1" nextAc="seek">
+              <p:cTn id="2" dur="indefinite" nodeType="mainSeq">
+                <p:childTnLst>
+                  <p:par>
+                    <p:cTn id="3" fill="hold">
+                      <p:stCondLst>
+                        <p:cond delay="indefinite"/>
+                      </p:stCondLst>
+                      <p:childTnLst>
+                        <p:par>
+                          <p:cTn id="4" fill="hold">
+                            <p:stCondLst>
+                              <p:cond delay="0"/>
+                            </p:stCondLst>
+                            <p:childTnLst>
+                              <p:par>
+                                <p:cTn id="5" presetID="1" presetClass="entr" presetSubtype="0" fill="hold" nodeType="clickEffect">
+                                  <p:stCondLst>
+                                    <p:cond delay="0"/>
+                                  </p:stCondLst>
+                                  <p:childTnLst>
+                                    <p:set>
+                                      <p:cBhvr>
+                                        <p:cTn id="6" dur="1" fill="hold">
+                                          <p:stCondLst>
+                                            <p:cond delay="0"/>
+                                          </p:stCondLst>
+                                        </p:cTn>
+                                        <p:tgtEl>
+                                          <p:spTgt spid="2">
+                                            <p:txEl>
+                                              <p:pRg st="0" end="0"/>
+                                            </p:txEl>
+                                          </p:spTgt>
+                                        </p:tgtEl>
+                                        <p:attrNameLst>
+                                          <p:attrName>style.visibility</p:attrName>
+                                        </p:attrNameLst>
+                                      </p:cBhvr>
+                                      <p:to>
+                                        <p:strVal val="visible"/>
+                                      </p:to>
+                                    </p:set>
+                                  </p:childTnLst>
+                                </p:cTn>
+                              </p:par>
+                            </p:childTnLst>
+                          </p:cTn>
+                        </p:par>
+                      </p:childTnLst>
+                    </p:cTn>
+                  </p:par>
+                  <p:par>
+                    <p:cTn id="7" fill="hold">
+                      <p:stCondLst>
+                        <p:cond delay="indefinite"/>
+                      </p:stCondLst>
+                      <p:childTnLst>
+                        <p:par>
+                          <p:cTn id="8" fill="hold">
+                            <p:stCondLst>
+                              <p:cond delay="0"/>
+                            </p:stCondLst>
+                            <p:childTnLst>
+                              <p:par>
+                                <p:cTn id="9" presetID="1" presetClass="entr" presetSubtype="0" fill="hold" nodeType="clickEffect">
+                                  <p:stCondLst>
+                                    <p:cond delay="0"/>
+                                  </p:stCondLst>
+                                  <p:childTnLst>
+                                    <p:set>
+                                      <p:cBhvr>
+                                        <p:cTn id="10" dur="1" fill="hold">
+                                          <p:stCondLst>
+                                            <p:cond delay="0"/>
+                                          </p:stCondLst>
+                                        </p:cTn>
+                                        <p:tgtEl>
+                                          <p:spTgt spid="2">
+                                            <p:txEl>
+                                              <p:pRg st="1" end="1"/>
+                                            </p:txEl>
+                                          </p:spTgt>
+                                        </p:tgtEl>
+                                        <p:attrNameLst>
+                                          <p:attrName>style.visibility</p:attrName>
+                                        </p:attrNameLst>
+                                      </p:cBhvr>
+                                      <p:to>
+                                        <p:strVal val="visible"/>
+                                      </p:to>
+                                    </p:set>
+                                  </p:childTnLst>
+                                </p:cTn>
+                              </p:par>
+                            </p:childTnLst>
+                          </p:cTn>
+                        </p:par>
+                      </p:childTnLst>
+                    </p:cTn>
+                  </p:par>
+                  <p:par>
+                    <p:cTn id="11" fill="hold">
+                      <p:stCondLst>
+                        <p:cond delay="indefinite"/>
+                      </p:stCondLst>
+                      <p:childTnLst>
+                        <p:par>
+                          <p:cTn id="12" fill="hold">
+                            <p:stCondLst>
+                              <p:cond delay="0"/>
+                            </p:stCondLst>
+                            <p:childTnLst>
+                              <p:par>
+                                <p:cTn id="13" presetID="1" presetClass="entr" presetSubtype="0" fill="hold" nodeType="clickEffect">
+                                  <p:stCondLst>
+                                    <p:cond delay="0"/>
+                                  </p:stCondLst>
+                                  <p:childTnLst>
+                                    <p:set>
+                                      <p:cBhvr>
+                                        <p:cTn id="14" dur="1" fill="hold">
+                                          <p:stCondLst>
+                                            <p:cond delay="0"/>
+                                          </p:stCondLst>
+                                        </p:cTn>
+                                        <p:tgtEl>
+                                          <p:spTgt spid="2">
+                                            <p:txEl>
+                                              <p:pRg st="2" end="2"/>
+                                            </p:txEl>
+                                          </p:spTgt>
+                                        </p:tgtEl>
+                                        <p:attrNameLst>
+                                          <p:attrName>style.visibility</p:attrName>
+                                        </p:attrNameLst>
+                                      </p:cBhvr>
+                                      <p:to>
+                                        <p:strVal val="visible"/>
+                                      </p:to>
+                                    </p:set>
+                                  </p:childTnLst>
+                                </p:cTn>
+                              </p:par>
+                              <p:par>
+                                <p:cTn id="15" presetID="1" presetClass="entr" presetSubtype="0" fill="hold" nodeType="withEffect">
+                                  <p:stCondLst>
+                                    <p:cond delay="0"/>
+                                  </p:stCondLst>
+                                  <p:childTnLst>
+                                    <p:set>
+                                      <p:cBhvr>
+                                        <p:cTn id="16" dur="1" fill="hold">
+                                          <p:stCondLst>
+                                            <p:cond delay="0"/>
+                                          </p:stCondLst>
+                                        </p:cTn>
+                                        <p:tgtEl>
+                                          <p:spTgt spid="2">
+                                            <p:txEl>
+                                              <p:pRg st="3" end="3"/>
+                                            </p:txEl>
+                                          </p:spTgt>
+                                        </p:tgtEl>
+                                        <p:attrNameLst>
+                                          <p:attrName>style.visibility</p:attrName>
+                                        </p:attrNameLst>
+                                      </p:cBhvr>
+                                      <p:to>
+                                        <p:strVal val="visible"/>
+                                      </p:to>
+                                    </p:set>
+                                  </p:childTnLst>
+                                </p:cTn>
+                              </p:par>
+                            </p:childTnLst>
+                          </p:cTn>
+                        </p:par>
+                      </p:childTnLst>
+                    </p:cTn>
+                  </p:par>
+                </p:childTnLst>
+              </p:cTn>
+              <p:prevCondLst>
+                <p:cond evt="onPrev" delay="0">
+                  <p:tgtEl>
+                    <p:sldTgt/>
+                  </p:tgtEl>
+                </p:cond>
+              </p:prevCondLst>
+              <p:nextCondLst>
+                <p:cond evt="onNext" delay="0">
+                  <p:tgtEl>
+                    <p:sldTgt/>
+                  </p:tgtEl>
+                </p:cond>
+              </p:nextCondLst>
+            </p:seq>
+          </p:childTnLst>
+        </p:cTn>
+      </p:par>
+    </p:tnLst>
+  </p:timing>
+</p:sld>
+</file>
+
+<file path=ppt/slides/slide30.xml><?xml version="1.0" encoding="utf-8"?>
 <p:sld xmlns:a="http://schemas.openxmlformats.org/drawingml/2006/main" xmlns:r="http://schemas.openxmlformats.org/officeDocument/2006/relationships" xmlns:p="http://schemas.openxmlformats.org/presentationml/2006/main">
   <p:cSld>
     <p:spTree>
@@ -26476,7 +27296,7 @@
             <a:fld id="{F36FED86-94EF-254D-90EE-B810FE8299EE}" type="slidenum">
               <a:rPr lang="en-US" smtClean="0"/>
               <a:pPr/>
-              <a:t>29</a:t>
+              <a:t>30</a:t>
             </a:fld>
             <a:endParaRPr lang="en-US"/>
           </a:p>
@@ -26732,405 +27552,7 @@
 </p:sld>
 </file>
 
-<file path=ppt/slides/slide3.xml><?xml version="1.0" encoding="utf-8"?>
-<p:sld xmlns:a="http://schemas.openxmlformats.org/drawingml/2006/main" xmlns:r="http://schemas.openxmlformats.org/officeDocument/2006/relationships" xmlns:p="http://schemas.openxmlformats.org/presentationml/2006/main">
-  <p:cSld>
-    <p:spTree>
-      <p:nvGrpSpPr>
-        <p:cNvPr id="1" name=""/>
-        <p:cNvGrpSpPr/>
-        <p:nvPr/>
-      </p:nvGrpSpPr>
-      <p:grpSpPr>
-        <a:xfrm>
-          <a:off x="0" y="0"/>
-          <a:ext cx="0" cy="0"/>
-          <a:chOff x="0" y="0"/>
-          <a:chExt cx="0" cy="0"/>
-        </a:xfrm>
-      </p:grpSpPr>
-      <p:sp>
-        <p:nvSpPr>
-          <p:cNvPr id="4" name="Title 3"/>
-          <p:cNvSpPr>
-            <a:spLocks noGrp="1"/>
-          </p:cNvSpPr>
-          <p:nvPr>
-            <p:ph type="title"/>
-          </p:nvPr>
-        </p:nvSpPr>
-        <p:spPr/>
-        <p:txBody>
-          <a:bodyPr/>
-          <a:lstStyle/>
-          <a:p>
-            <a:r>
-              <a:rPr lang="en-US" dirty="0"/>
-              <a:t>Goal of routing</a:t>
-            </a:r>
-          </a:p>
-        </p:txBody>
-      </p:sp>
-      <p:sp>
-        <p:nvSpPr>
-          <p:cNvPr id="2" name="Text Placeholder 1"/>
-          <p:cNvSpPr>
-            <a:spLocks noGrp="1"/>
-          </p:cNvSpPr>
-          <p:nvPr>
-            <p:ph idx="1"/>
-          </p:nvPr>
-        </p:nvSpPr>
-        <p:spPr/>
-        <p:txBody>
-          <a:bodyPr/>
-          <a:lstStyle/>
-          <a:p>
-            <a:r>
-              <a:rPr lang="en-US" dirty="0"/>
-              <a:t>Find a path to a given destination</a:t>
-            </a:r>
-          </a:p>
-          <a:p>
-            <a:r>
-              <a:rPr lang="en-US" dirty="0"/>
-              <a:t>How do we know that the state contained in forwarding tables meets our goal?</a:t>
-            </a:r>
-          </a:p>
-          <a:p>
-            <a:pPr lvl="1"/>
-            <a:r>
-              <a:rPr lang="en-US" dirty="0"/>
-              <a:t>This is what “</a:t>
-            </a:r>
-            <a:r>
-              <a:rPr lang="en-US" dirty="0">
-                <a:solidFill>
-                  <a:srgbClr val="0000FF"/>
-                </a:solidFill>
-              </a:rPr>
-              <a:t>validity</a:t>
-            </a:r>
-            <a:r>
-              <a:rPr lang="en-US" dirty="0"/>
-              <a:t>” of routing state tells us</a:t>
-            </a:r>
-          </a:p>
-          <a:p>
-            <a:pPr lvl="1"/>
-            <a:r>
-              <a:rPr lang="en-US" dirty="0">
-                <a:solidFill>
-                  <a:srgbClr val="0000FF"/>
-                </a:solidFill>
-              </a:rPr>
-              <a:t>[This is non-standard terminology]</a:t>
-            </a:r>
-          </a:p>
-          <a:p>
-            <a:pPr lvl="1"/>
-            <a:endParaRPr lang="en-US" dirty="0"/>
-          </a:p>
-        </p:txBody>
-      </p:sp>
-      <p:sp>
-        <p:nvSpPr>
-          <p:cNvPr id="260" name="Shape 260"/>
-          <p:cNvSpPr>
-            <a:spLocks noGrp="1"/>
-          </p:cNvSpPr>
-          <p:nvPr>
-            <p:ph type="sldNum" sz="quarter" idx="12"/>
-          </p:nvPr>
-        </p:nvSpPr>
-        <p:spPr/>
-        <p:txBody>
-          <a:bodyPr/>
-          <a:lstStyle/>
-          <a:p>
-            <a:pPr lvl="0"/>
-            <a:fld id="{86CB4B4D-7CA3-9044-876B-883B54F8677D}" type="slidenum">
-              <a:rPr lang="en-US" smtClean="0"/>
-              <a:pPr lvl="0"/>
-              <a:t>3</a:t>
-            </a:fld>
-            <a:endParaRPr lang="en-US"/>
-          </a:p>
-        </p:txBody>
-      </p:sp>
-      <p:sp>
-        <p:nvSpPr>
-          <p:cNvPr id="7" name="Date Placeholder 6"/>
-          <p:cNvSpPr>
-            <a:spLocks noGrp="1"/>
-          </p:cNvSpPr>
-          <p:nvPr>
-            <p:ph type="dt" sz="half" idx="10"/>
-          </p:nvPr>
-        </p:nvSpPr>
-        <p:spPr/>
-        <p:txBody>
-          <a:bodyPr/>
-          <a:lstStyle/>
-          <a:p>
-            <a:r>
-              <a:rPr lang="en-US"/>
-              <a:t>March 11, 2024</a:t>
-            </a:r>
-            <a:endParaRPr lang="en-US" sz="1050" b="0">
-              <a:latin typeface="Times New Roman" charset="0"/>
-            </a:endParaRPr>
-          </a:p>
-        </p:txBody>
-      </p:sp>
-      <p:sp>
-        <p:nvSpPr>
-          <p:cNvPr id="8" name="Footer Placeholder 7"/>
-          <p:cNvSpPr>
-            <a:spLocks noGrp="1"/>
-          </p:cNvSpPr>
-          <p:nvPr>
-            <p:ph type="ftr" sz="quarter" idx="11"/>
-          </p:nvPr>
-        </p:nvSpPr>
-        <p:spPr/>
-        <p:txBody>
-          <a:bodyPr/>
-          <a:lstStyle/>
-          <a:p>
-            <a:r>
-              <a:rPr lang="en-US"/>
-              <a:t>EECS 489 – Lecture 12</a:t>
-            </a:r>
-            <a:endParaRPr lang="en-US" sz="1050" b="0">
-              <a:latin typeface="Times New Roman" charset="0"/>
-            </a:endParaRPr>
-          </a:p>
-        </p:txBody>
-      </p:sp>
-    </p:spTree>
-    <p:extLst>
-      <p:ext uri="{BB962C8B-B14F-4D97-AF65-F5344CB8AC3E}">
-        <p14:creationId xmlns:p14="http://schemas.microsoft.com/office/powerpoint/2010/main" val="1120625018"/>
-      </p:ext>
-    </p:extLst>
-  </p:cSld>
-  <p:clrMapOvr>
-    <a:masterClrMapping/>
-  </p:clrMapOvr>
-  <p:transition spd="med"/>
-  <p:timing>
-    <p:tnLst>
-      <p:par>
-        <p:cTn id="1" dur="indefinite" restart="never" nodeType="tmRoot">
-          <p:childTnLst>
-            <p:seq concurrent="1" nextAc="seek">
-              <p:cTn id="2" dur="indefinite" nodeType="mainSeq">
-                <p:childTnLst>
-                  <p:par>
-                    <p:cTn id="3" fill="hold">
-                      <p:stCondLst>
-                        <p:cond delay="indefinite"/>
-                      </p:stCondLst>
-                      <p:childTnLst>
-                        <p:par>
-                          <p:cTn id="4" fill="hold">
-                            <p:stCondLst>
-                              <p:cond delay="0"/>
-                            </p:stCondLst>
-                            <p:childTnLst>
-                              <p:par>
-                                <p:cTn id="5" presetID="1" presetClass="entr" presetSubtype="0" fill="hold" nodeType="clickEffect">
-                                  <p:stCondLst>
-                                    <p:cond delay="0"/>
-                                  </p:stCondLst>
-                                  <p:childTnLst>
-                                    <p:set>
-                                      <p:cBhvr>
-                                        <p:cTn id="6" dur="1" fill="hold">
-                                          <p:stCondLst>
-                                            <p:cond delay="0"/>
-                                          </p:stCondLst>
-                                        </p:cTn>
-                                        <p:tgtEl>
-                                          <p:spTgt spid="2">
-                                            <p:txEl>
-                                              <p:pRg st="0" end="0"/>
-                                            </p:txEl>
-                                          </p:spTgt>
-                                        </p:tgtEl>
-                                        <p:attrNameLst>
-                                          <p:attrName>style.visibility</p:attrName>
-                                        </p:attrNameLst>
-                                      </p:cBhvr>
-                                      <p:to>
-                                        <p:strVal val="visible"/>
-                                      </p:to>
-                                    </p:set>
-                                  </p:childTnLst>
-                                </p:cTn>
-                              </p:par>
-                            </p:childTnLst>
-                          </p:cTn>
-                        </p:par>
-                      </p:childTnLst>
-                    </p:cTn>
-                  </p:par>
-                  <p:par>
-                    <p:cTn id="7" fill="hold">
-                      <p:stCondLst>
-                        <p:cond delay="indefinite"/>
-                      </p:stCondLst>
-                      <p:childTnLst>
-                        <p:par>
-                          <p:cTn id="8" fill="hold">
-                            <p:stCondLst>
-                              <p:cond delay="0"/>
-                            </p:stCondLst>
-                            <p:childTnLst>
-                              <p:par>
-                                <p:cTn id="9" presetID="1" presetClass="entr" presetSubtype="0" fill="hold" nodeType="clickEffect">
-                                  <p:stCondLst>
-                                    <p:cond delay="0"/>
-                                  </p:stCondLst>
-                                  <p:childTnLst>
-                                    <p:set>
-                                      <p:cBhvr>
-                                        <p:cTn id="10" dur="1" fill="hold">
-                                          <p:stCondLst>
-                                            <p:cond delay="0"/>
-                                          </p:stCondLst>
-                                        </p:cTn>
-                                        <p:tgtEl>
-                                          <p:spTgt spid="2">
-                                            <p:txEl>
-                                              <p:pRg st="1" end="1"/>
-                                            </p:txEl>
-                                          </p:spTgt>
-                                        </p:tgtEl>
-                                        <p:attrNameLst>
-                                          <p:attrName>style.visibility</p:attrName>
-                                        </p:attrNameLst>
-                                      </p:cBhvr>
-                                      <p:to>
-                                        <p:strVal val="visible"/>
-                                      </p:to>
-                                    </p:set>
-                                  </p:childTnLst>
-                                </p:cTn>
-                              </p:par>
-                            </p:childTnLst>
-                          </p:cTn>
-                        </p:par>
-                      </p:childTnLst>
-                    </p:cTn>
-                  </p:par>
-                  <p:par>
-                    <p:cTn id="11" fill="hold">
-                      <p:stCondLst>
-                        <p:cond delay="indefinite"/>
-                      </p:stCondLst>
-                      <p:childTnLst>
-                        <p:par>
-                          <p:cTn id="12" fill="hold">
-                            <p:stCondLst>
-                              <p:cond delay="0"/>
-                            </p:stCondLst>
-                            <p:childTnLst>
-                              <p:par>
-                                <p:cTn id="13" presetID="1" presetClass="entr" presetSubtype="0" fill="hold" nodeType="clickEffect">
-                                  <p:stCondLst>
-                                    <p:cond delay="0"/>
-                                  </p:stCondLst>
-                                  <p:childTnLst>
-                                    <p:set>
-                                      <p:cBhvr>
-                                        <p:cTn id="14" dur="1" fill="hold">
-                                          <p:stCondLst>
-                                            <p:cond delay="0"/>
-                                          </p:stCondLst>
-                                        </p:cTn>
-                                        <p:tgtEl>
-                                          <p:spTgt spid="2">
-                                            <p:txEl>
-                                              <p:pRg st="2" end="2"/>
-                                            </p:txEl>
-                                          </p:spTgt>
-                                        </p:tgtEl>
-                                        <p:attrNameLst>
-                                          <p:attrName>style.visibility</p:attrName>
-                                        </p:attrNameLst>
-                                      </p:cBhvr>
-                                      <p:to>
-                                        <p:strVal val="visible"/>
-                                      </p:to>
-                                    </p:set>
-                                  </p:childTnLst>
-                                </p:cTn>
-                              </p:par>
-                              <p:par>
-                                <p:cTn id="15" presetID="1" presetClass="entr" presetSubtype="0" fill="hold" nodeType="withEffect">
-                                  <p:stCondLst>
-                                    <p:cond delay="0"/>
-                                  </p:stCondLst>
-                                  <p:childTnLst>
-                                    <p:set>
-                                      <p:cBhvr>
-                                        <p:cTn id="16" dur="1" fill="hold">
-                                          <p:stCondLst>
-                                            <p:cond delay="0"/>
-                                          </p:stCondLst>
-                                        </p:cTn>
-                                        <p:tgtEl>
-                                          <p:spTgt spid="2">
-                                            <p:txEl>
-                                              <p:pRg st="3" end="3"/>
-                                            </p:txEl>
-                                          </p:spTgt>
-                                        </p:tgtEl>
-                                        <p:attrNameLst>
-                                          <p:attrName>style.visibility</p:attrName>
-                                        </p:attrNameLst>
-                                      </p:cBhvr>
-                                      <p:to>
-                                        <p:strVal val="visible"/>
-                                      </p:to>
-                                    </p:set>
-                                  </p:childTnLst>
-                                </p:cTn>
-                              </p:par>
-                            </p:childTnLst>
-                          </p:cTn>
-                        </p:par>
-                      </p:childTnLst>
-                    </p:cTn>
-                  </p:par>
-                </p:childTnLst>
-              </p:cTn>
-              <p:prevCondLst>
-                <p:cond evt="onPrev" delay="0">
-                  <p:tgtEl>
-                    <p:sldTgt/>
-                  </p:tgtEl>
-                </p:cond>
-              </p:prevCondLst>
-              <p:nextCondLst>
-                <p:cond evt="onNext" delay="0">
-                  <p:tgtEl>
-                    <p:sldTgt/>
-                  </p:tgtEl>
-                </p:cond>
-              </p:nextCondLst>
-            </p:seq>
-          </p:childTnLst>
-        </p:cTn>
-      </p:par>
-    </p:tnLst>
-  </p:timing>
-</p:sld>
-</file>
-
-<file path=ppt/slides/slide30.xml><?xml version="1.0" encoding="utf-8"?>
+<file path=ppt/slides/slide31.xml><?xml version="1.0" encoding="utf-8"?>
 <p:sld xmlns:a="http://schemas.openxmlformats.org/drawingml/2006/main" xmlns:r="http://schemas.openxmlformats.org/officeDocument/2006/relationships" xmlns:p="http://schemas.openxmlformats.org/presentationml/2006/main">
   <p:cSld>
     <p:spTree>
@@ -27363,7 +27785,7 @@
             <a:fld id="{A190D881-957A-7944-A8D0-1584E528B88F}" type="slidenum">
               <a:rPr lang="en-US" smtClean="0"/>
               <a:pPr/>
-              <a:t>30</a:t>
+              <a:t>31</a:t>
             </a:fld>
             <a:endParaRPr lang="en-US"/>
           </a:p>
@@ -27382,7 +27804,7 @@
 </p:sld>
 </file>
 
-<file path=ppt/slides/slide31.xml><?xml version="1.0" encoding="utf-8"?>
+<file path=ppt/slides/slide32.xml><?xml version="1.0" encoding="utf-8"?>
 <p:sld xmlns:a="http://schemas.openxmlformats.org/drawingml/2006/main" xmlns:r="http://schemas.openxmlformats.org/officeDocument/2006/relationships" xmlns:p="http://schemas.openxmlformats.org/presentationml/2006/main">
   <p:cSld>
     <p:spTree>
@@ -27899,7 +28321,7 @@
             <a:fld id="{A190D881-957A-7944-A8D0-1584E528B88F}" type="slidenum">
               <a:rPr lang="en-US" smtClean="0"/>
               <a:pPr/>
-              <a:t>31</a:t>
+              <a:t>32</a:t>
             </a:fld>
             <a:endParaRPr lang="en-US"/>
           </a:p>
@@ -27918,7 +28340,7 @@
 </p:sld>
 </file>
 
-<file path=ppt/slides/slide32.xml><?xml version="1.0" encoding="utf-8"?>
+<file path=ppt/slides/slide33.xml><?xml version="1.0" encoding="utf-8"?>
 <p:sld xmlns:a="http://schemas.openxmlformats.org/drawingml/2006/main" xmlns:r="http://schemas.openxmlformats.org/officeDocument/2006/relationships" xmlns:p="http://schemas.openxmlformats.org/presentationml/2006/main">
   <p:cSld>
     <p:spTree>
@@ -38318,7 +38740,7 @@
             <a:fld id="{9507A418-0CEB-9E4A-BA45-3B7D3D133EB9}" type="slidenum">
               <a:rPr lang="en-US" smtClean="0"/>
               <a:pPr/>
-              <a:t>32</a:t>
+              <a:t>33</a:t>
             </a:fld>
             <a:endParaRPr lang="en-US"/>
           </a:p>
@@ -39418,7 +39840,7 @@
 </p:sld>
 </file>
 
-<file path=ppt/slides/slide33.xml><?xml version="1.0" encoding="utf-8"?>
+<file path=ppt/slides/slide34.xml><?xml version="1.0" encoding="utf-8"?>
 <p:sld xmlns:a="http://schemas.openxmlformats.org/drawingml/2006/main" xmlns:r="http://schemas.openxmlformats.org/officeDocument/2006/relationships" xmlns:p="http://schemas.openxmlformats.org/presentationml/2006/main">
   <p:cSld>
     <p:spTree>
@@ -43551,7 +43973,7 @@
             <a:fld id="{9507A418-0CEB-9E4A-BA45-3B7D3D133EB9}" type="slidenum">
               <a:rPr lang="en-US" smtClean="0"/>
               <a:pPr/>
-              <a:t>33</a:t>
+              <a:t>34</a:t>
             </a:fld>
             <a:endParaRPr lang="en-US"/>
           </a:p>
@@ -43675,7 +44097,7 @@
 </p:sld>
 </file>
 
-<file path=ppt/slides/slide34.xml><?xml version="1.0" encoding="utf-8"?>
+<file path=ppt/slides/slide35.xml><?xml version="1.0" encoding="utf-8"?>
 <p:sld xmlns:a="http://schemas.openxmlformats.org/drawingml/2006/main" xmlns:r="http://schemas.openxmlformats.org/officeDocument/2006/relationships" xmlns:p="http://schemas.openxmlformats.org/presentationml/2006/main">
   <p:cSld>
     <p:spTree>
@@ -43839,7 +44261,7 @@
             <a:fld id="{A190D881-957A-7944-A8D0-1584E528B88F}" type="slidenum">
               <a:rPr lang="en-US" smtClean="0"/>
               <a:pPr/>
-              <a:t>34</a:t>
+              <a:t>35</a:t>
             </a:fld>
             <a:endParaRPr lang="en-US"/>
           </a:p>

</xml_diff>